<commit_message>
update new front page
</commit_message>
<xml_diff>
--- a/presentation/slides/phd.pptx
+++ b/presentation/slides/phd.pptx
@@ -5,12 +5,15 @@
     <p:sldMasterId id="2147483648" r:id="rId1"/>
   </p:sldMasterIdLst>
   <p:notesMasterIdLst>
-    <p:notesMasterId r:id="rId5"/>
+    <p:notesMasterId r:id="rId8"/>
   </p:notesMasterIdLst>
   <p:sldIdLst>
     <p:sldId id="256" r:id="rId2"/>
     <p:sldId id="258" r:id="rId3"/>
-    <p:sldId id="257" r:id="rId4"/>
+    <p:sldId id="259" r:id="rId4"/>
+    <p:sldId id="260" r:id="rId5"/>
+    <p:sldId id="257" r:id="rId6"/>
+    <p:sldId id="261" r:id="rId7"/>
   </p:sldIdLst>
   <p:sldSz cx="9144000" cy="5143500" type="screen16x9"/>
   <p:notesSz cx="6858000" cy="9144000"/>
@@ -110,6 +113,20 @@
     </a:lvl9pPr>
   </p:defaultTextStyle>
   <p:extLst>
+    <p:ext uri="{521415D9-36F7-43E2-AB2F-B90AF26B5E84}">
+      <p14:sectionLst xmlns:p14="http://schemas.microsoft.com/office/powerpoint/2010/main">
+        <p14:section name="Introduction" id="{673F1B9F-02B2-4773-8550-8E1906F8FA59}">
+          <p14:sldIdLst>
+            <p14:sldId id="256"/>
+            <p14:sldId id="258"/>
+            <p14:sldId id="259"/>
+            <p14:sldId id="260"/>
+            <p14:sldId id="257"/>
+            <p14:sldId id="261"/>
+          </p14:sldIdLst>
+        </p14:section>
+      </p14:sectionLst>
+    </p:ext>
     <p:ext uri="{EFAFB233-063F-42B5-8137-9DF3F51BA10A}">
       <p15:sldGuideLst xmlns:p15="http://schemas.microsoft.com/office/powerpoint/2012/main">
         <p15:guide id="1" orient="horz" pos="1620">
@@ -553,6 +570,180 @@
     <p:extLst>
       <p:ext uri="{BB962C8B-B14F-4D97-AF65-F5344CB8AC3E}">
         <p14:creationId xmlns:p14="http://schemas.microsoft.com/office/powerpoint/2010/main" val="3202428120"/>
+      </p:ext>
+    </p:extLst>
+  </p:cSld>
+  <p:clrMapOvr>
+    <a:masterClrMapping/>
+  </p:clrMapOvr>
+</p:notes>
+</file>
+
+<file path=ppt/notesSlides/notesSlide2.xml><?xml version="1.0" encoding="utf-8"?>
+<p:notes xmlns:a="http://schemas.openxmlformats.org/drawingml/2006/main" xmlns:r="http://schemas.openxmlformats.org/officeDocument/2006/relationships" xmlns:p="http://schemas.openxmlformats.org/presentationml/2006/main">
+  <p:cSld>
+    <p:spTree>
+      <p:nvGrpSpPr>
+        <p:cNvPr id="1" name=""/>
+        <p:cNvGrpSpPr/>
+        <p:nvPr/>
+      </p:nvGrpSpPr>
+      <p:grpSpPr>
+        <a:xfrm>
+          <a:off x="0" y="0"/>
+          <a:ext cx="0" cy="0"/>
+          <a:chOff x="0" y="0"/>
+          <a:chExt cx="0" cy="0"/>
+        </a:xfrm>
+      </p:grpSpPr>
+      <p:sp>
+        <p:nvSpPr>
+          <p:cNvPr id="2" name="Slide Image Placeholder 1"/>
+          <p:cNvSpPr>
+            <a:spLocks noGrp="1" noRot="1" noChangeAspect="1"/>
+          </p:cNvSpPr>
+          <p:nvPr>
+            <p:ph type="sldImg"/>
+          </p:nvPr>
+        </p:nvSpPr>
+        <p:spPr/>
+      </p:sp>
+      <p:sp>
+        <p:nvSpPr>
+          <p:cNvPr id="3" name="Notes Placeholder 2"/>
+          <p:cNvSpPr>
+            <a:spLocks noGrp="1"/>
+          </p:cNvSpPr>
+          <p:nvPr>
+            <p:ph type="body" idx="1"/>
+          </p:nvPr>
+        </p:nvSpPr>
+        <p:spPr/>
+        <p:txBody>
+          <a:bodyPr/>
+          <a:lstStyle/>
+          <a:p>
+            <a:r>
+              <a:rPr lang="en-NO"/>
+              <a:t>Oceans are a vital part of our daily lives, with a major role to play in regulating the Earth's climate and supporting life on this planet. They provide us with food, energy, and transportation, and are also home to intricate ecosystems that are important for biodiversity. However, human activities are increasingly putting pressure on these ecosystems, with overfishing, pollution, and climate change all affecting the health of our oceans. It's important that we work to protect and conserve these important resources for future generations.</a:t>
+            </a:r>
+          </a:p>
+        </p:txBody>
+      </p:sp>
+      <p:sp>
+        <p:nvSpPr>
+          <p:cNvPr id="4" name="Slide Number Placeholder 3"/>
+          <p:cNvSpPr>
+            <a:spLocks noGrp="1"/>
+          </p:cNvSpPr>
+          <p:nvPr>
+            <p:ph type="sldNum" sz="quarter" idx="5"/>
+          </p:nvPr>
+        </p:nvSpPr>
+        <p:spPr/>
+        <p:txBody>
+          <a:bodyPr/>
+          <a:lstStyle/>
+          <a:p>
+            <a:fld id="{E62788E2-7A01-D94F-A69A-99201CD12588}" type="slidenum">
+              <a:rPr lang="en-NO" smtClean="0"/>
+              <a:t>4</a:t>
+            </a:fld>
+            <a:endParaRPr lang="en-NO"/>
+          </a:p>
+        </p:txBody>
+      </p:sp>
+    </p:spTree>
+    <p:extLst>
+      <p:ext uri="{BB962C8B-B14F-4D97-AF65-F5344CB8AC3E}">
+        <p14:creationId xmlns:p14="http://schemas.microsoft.com/office/powerpoint/2010/main" val="2291914863"/>
+      </p:ext>
+    </p:extLst>
+  </p:cSld>
+  <p:clrMapOvr>
+    <a:masterClrMapping/>
+  </p:clrMapOvr>
+</p:notes>
+</file>
+
+<file path=ppt/notesSlides/notesSlide3.xml><?xml version="1.0" encoding="utf-8"?>
+<p:notes xmlns:a="http://schemas.openxmlformats.org/drawingml/2006/main" xmlns:r="http://schemas.openxmlformats.org/officeDocument/2006/relationships" xmlns:p="http://schemas.openxmlformats.org/presentationml/2006/main">
+  <p:cSld>
+    <p:spTree>
+      <p:nvGrpSpPr>
+        <p:cNvPr id="1" name=""/>
+        <p:cNvGrpSpPr/>
+        <p:nvPr/>
+      </p:nvGrpSpPr>
+      <p:grpSpPr>
+        <a:xfrm>
+          <a:off x="0" y="0"/>
+          <a:ext cx="0" cy="0"/>
+          <a:chOff x="0" y="0"/>
+          <a:chExt cx="0" cy="0"/>
+        </a:xfrm>
+      </p:grpSpPr>
+      <p:sp>
+        <p:nvSpPr>
+          <p:cNvPr id="2" name="Slide Image Placeholder 1"/>
+          <p:cNvSpPr>
+            <a:spLocks noGrp="1" noRot="1" noChangeAspect="1"/>
+          </p:cNvSpPr>
+          <p:nvPr>
+            <p:ph type="sldImg"/>
+          </p:nvPr>
+        </p:nvSpPr>
+        <p:spPr/>
+      </p:sp>
+      <p:sp>
+        <p:nvSpPr>
+          <p:cNvPr id="3" name="Notes Placeholder 2"/>
+          <p:cNvSpPr>
+            <a:spLocks noGrp="1"/>
+          </p:cNvSpPr>
+          <p:nvPr>
+            <p:ph type="body" idx="1"/>
+          </p:nvPr>
+        </p:nvSpPr>
+        <p:spPr/>
+        <p:txBody>
+          <a:bodyPr/>
+          <a:lstStyle/>
+          <a:p>
+            <a:r>
+              <a:rPr lang="en-NO"/>
+              <a:t>An ocean front is the boundary between two different water masses, and typically has sharp gradients in temperature, salinity, and other properties. River plume fronts are important for many reasons, including for example, their impact on coastal ecosystems and the transport of pollutants. By using adaptive sampling and autonomous path planning, we can better study these important features of our oceans.</a:t>
+            </a:r>
+          </a:p>
+        </p:txBody>
+      </p:sp>
+      <p:sp>
+        <p:nvSpPr>
+          <p:cNvPr id="4" name="Slide Number Placeholder 3"/>
+          <p:cNvSpPr>
+            <a:spLocks noGrp="1"/>
+          </p:cNvSpPr>
+          <p:nvPr>
+            <p:ph type="sldNum" sz="quarter" idx="5"/>
+          </p:nvPr>
+        </p:nvSpPr>
+        <p:spPr/>
+        <p:txBody>
+          <a:bodyPr/>
+          <a:lstStyle/>
+          <a:p>
+            <a:fld id="{E62788E2-7A01-D94F-A69A-99201CD12588}" type="slidenum">
+              <a:rPr lang="en-NO" smtClean="0"/>
+              <a:t>6</a:t>
+            </a:fld>
+            <a:endParaRPr lang="en-NO"/>
+          </a:p>
+        </p:txBody>
+      </p:sp>
+    </p:spTree>
+    <p:extLst>
+      <p:ext uri="{BB962C8B-B14F-4D97-AF65-F5344CB8AC3E}">
+        <p14:creationId xmlns:p14="http://schemas.microsoft.com/office/powerpoint/2010/main" val="3606122724"/>
       </p:ext>
     </p:extLst>
   </p:cSld>
@@ -3653,7 +3844,44 @@
           <a:bodyPr/>
           <a:lstStyle/>
           <a:p>
-            <a:endParaRPr lang="en-NO"/>
+            <a:r>
+              <a:rPr lang="en-NO" dirty="0"/>
+              <a:t>Introduction</a:t>
+            </a:r>
+          </a:p>
+          <a:p>
+            <a:r>
+              <a:rPr lang="en-NO" dirty="0"/>
+              <a:t>Research questions</a:t>
+            </a:r>
+          </a:p>
+          <a:p>
+            <a:r>
+              <a:rPr lang="en-GB" dirty="0"/>
+              <a:t>O</a:t>
+            </a:r>
+            <a:r>
+              <a:rPr lang="en-NO" dirty="0"/>
+              <a:t>ur approach</a:t>
+            </a:r>
+          </a:p>
+          <a:p>
+            <a:r>
+              <a:rPr lang="en-NO" dirty="0"/>
+              <a:t>Validation and testing</a:t>
+            </a:r>
+          </a:p>
+          <a:p>
+            <a:r>
+              <a:rPr lang="en-NO" dirty="0"/>
+              <a:t>Remarks</a:t>
+            </a:r>
+          </a:p>
+          <a:p>
+            <a:r>
+              <a:rPr lang="en-NO" dirty="0"/>
+              <a:t>Conclusion</a:t>
+            </a:r>
           </a:p>
         </p:txBody>
       </p:sp>
@@ -3678,7 +3906,10 @@
           <a:bodyPr/>
           <a:lstStyle/>
           <a:p>
-            <a:endParaRPr lang="en-NO"/>
+            <a:r>
+              <a:rPr lang="en-NO" dirty="0"/>
+              <a:t>Agenda</a:t>
+            </a:r>
           </a:p>
         </p:txBody>
       </p:sp>
@@ -3712,10 +3943,425 @@
           <a:chExt cx="0" cy="0"/>
         </a:xfrm>
       </p:grpSpPr>
+      <p:sp>
+        <p:nvSpPr>
+          <p:cNvPr id="2" name="Content Placeholder 1">
+            <a:extLst>
+              <a:ext uri="{FF2B5EF4-FFF2-40B4-BE49-F238E27FC236}">
+                <a16:creationId xmlns:a16="http://schemas.microsoft.com/office/drawing/2014/main" id="{423769BC-8DCB-2FB2-0FF7-71C57112EECC}"/>
+              </a:ext>
+            </a:extLst>
+          </p:cNvPr>
+          <p:cNvSpPr>
+            <a:spLocks noGrp="1"/>
+          </p:cNvSpPr>
+          <p:nvPr>
+            <p:ph idx="1"/>
+          </p:nvPr>
+        </p:nvSpPr>
+        <p:spPr/>
+        <p:txBody>
+          <a:bodyPr/>
+          <a:lstStyle/>
+          <a:p>
+            <a:endParaRPr lang="en-NO"/>
+          </a:p>
+        </p:txBody>
+      </p:sp>
+      <p:sp>
+        <p:nvSpPr>
+          <p:cNvPr id="3" name="Title 2">
+            <a:extLst>
+              <a:ext uri="{FF2B5EF4-FFF2-40B4-BE49-F238E27FC236}">
+                <a16:creationId xmlns:a16="http://schemas.microsoft.com/office/drawing/2014/main" id="{76B587F3-77FB-4434-F17B-855B3D1FFD18}"/>
+              </a:ext>
+            </a:extLst>
+          </p:cNvPr>
+          <p:cNvSpPr>
+            <a:spLocks noGrp="1"/>
+          </p:cNvSpPr>
+          <p:nvPr>
+            <p:ph type="title"/>
+          </p:nvPr>
+        </p:nvSpPr>
+        <p:spPr/>
+        <p:txBody>
+          <a:bodyPr/>
+          <a:lstStyle/>
+          <a:p>
+            <a:endParaRPr lang="en-NO"/>
+          </a:p>
+        </p:txBody>
+      </p:sp>
+    </p:spTree>
+    <p:extLst>
+      <p:ext uri="{BB962C8B-B14F-4D97-AF65-F5344CB8AC3E}">
+        <p14:creationId xmlns:p14="http://schemas.microsoft.com/office/powerpoint/2010/main" val="1693402847"/>
+      </p:ext>
+    </p:extLst>
+  </p:cSld>
+  <p:clrMapOvr>
+    <a:masterClrMapping/>
+  </p:clrMapOvr>
+</p:sld>
+</file>
+
+<file path=ppt/slides/slide4.xml><?xml version="1.0" encoding="utf-8"?>
+<p:sld xmlns:a="http://schemas.openxmlformats.org/drawingml/2006/main" xmlns:r="http://schemas.openxmlformats.org/officeDocument/2006/relationships" xmlns:p="http://schemas.openxmlformats.org/presentationml/2006/main">
+  <p:cSld>
+    <p:spTree>
+      <p:nvGrpSpPr>
+        <p:cNvPr id="1" name=""/>
+        <p:cNvGrpSpPr/>
+        <p:nvPr/>
+      </p:nvGrpSpPr>
+      <p:grpSpPr>
+        <a:xfrm>
+          <a:off x="0" y="0"/>
+          <a:ext cx="0" cy="0"/>
+          <a:chOff x="0" y="0"/>
+          <a:chExt cx="0" cy="0"/>
+        </a:xfrm>
+      </p:grpSpPr>
+      <p:sp>
+        <p:nvSpPr>
+          <p:cNvPr id="2" name="Title 1">
+            <a:extLst>
+              <a:ext uri="{FF2B5EF4-FFF2-40B4-BE49-F238E27FC236}">
+                <a16:creationId xmlns:a16="http://schemas.microsoft.com/office/drawing/2014/main" id="{4DA7DCAF-6265-EB34-47A5-2EAF5C55632A}"/>
+              </a:ext>
+            </a:extLst>
+          </p:cNvPr>
+          <p:cNvSpPr>
+            <a:spLocks noGrp="1"/>
+          </p:cNvSpPr>
+          <p:nvPr>
+            <p:ph type="title"/>
+          </p:nvPr>
+        </p:nvSpPr>
+        <p:spPr>
+          <a:xfrm>
+            <a:off x="314320" y="205979"/>
+            <a:ext cx="8229600" cy="646331"/>
+          </a:xfrm>
+        </p:spPr>
+        <p:txBody>
+          <a:bodyPr anchor="t">
+            <a:normAutofit/>
+          </a:bodyPr>
+          <a:lstStyle/>
+          <a:p>
+            <a:pPr>
+              <a:lnSpc>
+                <a:spcPct val="90000"/>
+              </a:lnSpc>
+            </a:pPr>
+            <a:r>
+              <a:rPr lang="en-NO" sz="2800"/>
+              <a:t>The Importance of Oceans in Our Daily Life</a:t>
+            </a:r>
+          </a:p>
+        </p:txBody>
+      </p:sp>
+      <p:pic>
+        <p:nvPicPr>
+          <p:cNvPr id="5" name="Content Placeholder 4" descr="High angle view of the sea">
+            <a:extLst>
+              <a:ext uri="{FF2B5EF4-FFF2-40B4-BE49-F238E27FC236}">
+                <a16:creationId xmlns:a16="http://schemas.microsoft.com/office/drawing/2014/main" id="{E7F964F8-F631-4F7C-A714-3958B1BCCCC8}"/>
+              </a:ext>
+            </a:extLst>
+          </p:cNvPr>
+          <p:cNvPicPr>
+            <a:picLocks noGrp="1" noChangeAspect="1"/>
+          </p:cNvPicPr>
+          <p:nvPr>
+            <p:ph sz="half" idx="1"/>
+          </p:nvPr>
+        </p:nvPicPr>
+        <p:blipFill rotWithShape="1">
+          <a:blip r:embed="rId3"/>
+          <a:srcRect l="866" r="19716" b="-3"/>
+          <a:stretch/>
+        </p:blipFill>
+        <p:spPr>
+          <a:xfrm>
+            <a:off x="457200" y="1200151"/>
+            <a:ext cx="4038600" cy="3394472"/>
+          </a:xfrm>
+          <a:noFill/>
+        </p:spPr>
+      </p:pic>
+      <p:sp>
+        <p:nvSpPr>
+          <p:cNvPr id="4" name="Content Placeholder 3">
+            <a:extLst>
+              <a:ext uri="{FF2B5EF4-FFF2-40B4-BE49-F238E27FC236}">
+                <a16:creationId xmlns:a16="http://schemas.microsoft.com/office/drawing/2014/main" id="{BC736B99-A25C-EC19-0DDA-0E81401D6148}"/>
+              </a:ext>
+            </a:extLst>
+          </p:cNvPr>
+          <p:cNvSpPr>
+            <a:spLocks noGrp="1"/>
+          </p:cNvSpPr>
+          <p:nvPr>
+            <p:ph sz="half" idx="2"/>
+          </p:nvPr>
+        </p:nvSpPr>
+        <p:spPr>
+          <a:xfrm>
+            <a:off x="4648200" y="1200151"/>
+            <a:ext cx="4038600" cy="3394472"/>
+          </a:xfrm>
+        </p:spPr>
+        <p:txBody>
+          <a:bodyPr>
+            <a:normAutofit/>
+          </a:bodyPr>
+          <a:lstStyle/>
+          <a:p>
+            <a:pPr>
+              <a:lnSpc>
+                <a:spcPct val="90000"/>
+              </a:lnSpc>
+            </a:pPr>
+            <a:r>
+              <a:rPr lang="en-GB" sz="1500"/>
+              <a:t>Oceans are a major heat reservoir and influence weather patterns, moderating temperature and making Earth habitable.</a:t>
+            </a:r>
+          </a:p>
+          <a:p>
+            <a:pPr>
+              <a:lnSpc>
+                <a:spcPct val="90000"/>
+              </a:lnSpc>
+            </a:pPr>
+            <a:r>
+              <a:rPr lang="en-GB" sz="1500"/>
+              <a:t>Oceans produce more than half of the oxygen we breathe and are home to countless species, many of which are yet to be discovered.</a:t>
+            </a:r>
+          </a:p>
+          <a:p>
+            <a:pPr>
+              <a:lnSpc>
+                <a:spcPct val="90000"/>
+              </a:lnSpc>
+            </a:pPr>
+            <a:r>
+              <a:rPr lang="en-GB" sz="1500"/>
+              <a:t>The fishing industry depends on oceans as a source of food and livelihood, making it critical for many coastal communities.</a:t>
+            </a:r>
+          </a:p>
+          <a:p>
+            <a:pPr>
+              <a:lnSpc>
+                <a:spcPct val="90000"/>
+              </a:lnSpc>
+            </a:pPr>
+            <a:r>
+              <a:rPr lang="en-GB" sz="1500"/>
+              <a:t>Oceans are also essential for global trade transportation, with around 80% of all trade goods transported by ships.</a:t>
+            </a:r>
+            <a:endParaRPr lang="en-NO" sz="1500"/>
+          </a:p>
+        </p:txBody>
+      </p:sp>
+    </p:spTree>
+    <p:extLst>
+      <p:ext uri="{BB962C8B-B14F-4D97-AF65-F5344CB8AC3E}">
+        <p14:creationId xmlns:p14="http://schemas.microsoft.com/office/powerpoint/2010/main" val="1981921535"/>
+      </p:ext>
+    </p:extLst>
+  </p:cSld>
+  <p:clrMapOvr>
+    <a:masterClrMapping/>
+  </p:clrMapOvr>
+</p:sld>
+</file>
+
+<file path=ppt/slides/slide5.xml><?xml version="1.0" encoding="utf-8"?>
+<p:sld xmlns:a="http://schemas.openxmlformats.org/drawingml/2006/main" xmlns:r="http://schemas.openxmlformats.org/officeDocument/2006/relationships" xmlns:p="http://schemas.openxmlformats.org/presentationml/2006/main">
+  <p:cSld>
+    <p:spTree>
+      <p:nvGrpSpPr>
+        <p:cNvPr id="1" name=""/>
+        <p:cNvGrpSpPr/>
+        <p:nvPr/>
+      </p:nvGrpSpPr>
+      <p:grpSpPr>
+        <a:xfrm>
+          <a:off x="0" y="0"/>
+          <a:ext cx="0" cy="0"/>
+          <a:chOff x="0" y="0"/>
+          <a:chExt cx="0" cy="0"/>
+        </a:xfrm>
+      </p:grpSpPr>
     </p:spTree>
     <p:extLst>
       <p:ext uri="{BB962C8B-B14F-4D97-AF65-F5344CB8AC3E}">
         <p14:creationId xmlns:p14="http://schemas.microsoft.com/office/powerpoint/2010/main" val="4218736845"/>
+      </p:ext>
+    </p:extLst>
+  </p:cSld>
+  <p:clrMapOvr>
+    <a:masterClrMapping/>
+  </p:clrMapOvr>
+</p:sld>
+</file>
+
+<file path=ppt/slides/slide6.xml><?xml version="1.0" encoding="utf-8"?>
+<p:sld xmlns:a="http://schemas.openxmlformats.org/drawingml/2006/main" xmlns:r="http://schemas.openxmlformats.org/officeDocument/2006/relationships" xmlns:p="http://schemas.openxmlformats.org/presentationml/2006/main">
+  <p:cSld>
+    <p:spTree>
+      <p:nvGrpSpPr>
+        <p:cNvPr id="1" name=""/>
+        <p:cNvGrpSpPr/>
+        <p:nvPr/>
+      </p:nvGrpSpPr>
+      <p:grpSpPr>
+        <a:xfrm>
+          <a:off x="0" y="0"/>
+          <a:ext cx="0" cy="0"/>
+          <a:chOff x="0" y="0"/>
+          <a:chExt cx="0" cy="0"/>
+        </a:xfrm>
+      </p:grpSpPr>
+      <p:sp>
+        <p:nvSpPr>
+          <p:cNvPr id="2" name="Title 1">
+            <a:extLst>
+              <a:ext uri="{FF2B5EF4-FFF2-40B4-BE49-F238E27FC236}">
+                <a16:creationId xmlns:a16="http://schemas.microsoft.com/office/drawing/2014/main" id="{9EA36206-F699-F0C9-02E0-EC033514805E}"/>
+              </a:ext>
+            </a:extLst>
+          </p:cNvPr>
+          <p:cNvSpPr>
+            <a:spLocks noGrp="1"/>
+          </p:cNvSpPr>
+          <p:nvPr>
+            <p:ph type="title"/>
+          </p:nvPr>
+        </p:nvSpPr>
+        <p:spPr>
+          <a:xfrm>
+            <a:off x="314320" y="205979"/>
+            <a:ext cx="8229600" cy="646331"/>
+          </a:xfrm>
+        </p:spPr>
+        <p:txBody>
+          <a:bodyPr anchor="t">
+            <a:normAutofit/>
+          </a:bodyPr>
+          <a:lstStyle/>
+          <a:p>
+            <a:pPr>
+              <a:lnSpc>
+                <a:spcPct val="90000"/>
+              </a:lnSpc>
+            </a:pPr>
+            <a:r>
+              <a:rPr lang="en-NO" sz="3100"/>
+              <a:t>Adaptive Sampling of River Plume Fronts</a:t>
+            </a:r>
+          </a:p>
+        </p:txBody>
+      </p:sp>
+      <p:pic>
+        <p:nvPicPr>
+          <p:cNvPr id="5" name="Content Placeholder 4" descr="El Malecón, Santo Domingo's Maritime Boulevard, alongside the Caribbean sea's waterfront. &#13;&#10;The Boulevard have the most exclusive hotels, several casinos, the complex Malecón Center, the Obelisk.&#13;&#10;Dominican Republic">
+            <a:extLst>
+              <a:ext uri="{FF2B5EF4-FFF2-40B4-BE49-F238E27FC236}">
+                <a16:creationId xmlns:a16="http://schemas.microsoft.com/office/drawing/2014/main" id="{F3A15927-9981-4BE6-A3AD-F20F716B3661}"/>
+              </a:ext>
+            </a:extLst>
+          </p:cNvPr>
+          <p:cNvPicPr>
+            <a:picLocks noGrp="1" noChangeAspect="1"/>
+          </p:cNvPicPr>
+          <p:nvPr>
+            <p:ph sz="half" idx="1"/>
+          </p:nvPr>
+        </p:nvPicPr>
+        <p:blipFill rotWithShape="1">
+          <a:blip r:embed="rId3"/>
+          <a:srcRect l="10768" r="1" b="1"/>
+          <a:stretch/>
+        </p:blipFill>
+        <p:spPr>
+          <a:xfrm>
+            <a:off x="457200" y="1200151"/>
+            <a:ext cx="4038600" cy="3394472"/>
+          </a:xfrm>
+          <a:noFill/>
+        </p:spPr>
+      </p:pic>
+      <p:sp>
+        <p:nvSpPr>
+          <p:cNvPr id="4" name="Content Placeholder 3">
+            <a:extLst>
+              <a:ext uri="{FF2B5EF4-FFF2-40B4-BE49-F238E27FC236}">
+                <a16:creationId xmlns:a16="http://schemas.microsoft.com/office/drawing/2014/main" id="{4467244D-7A0F-5DEF-4F75-324FA8989918}"/>
+              </a:ext>
+            </a:extLst>
+          </p:cNvPr>
+          <p:cNvSpPr>
+            <a:spLocks noGrp="1"/>
+          </p:cNvSpPr>
+          <p:nvPr>
+            <p:ph sz="half" idx="2"/>
+          </p:nvPr>
+        </p:nvSpPr>
+        <p:spPr>
+          <a:xfrm>
+            <a:off x="4648200" y="1200151"/>
+            <a:ext cx="4038600" cy="3394472"/>
+          </a:xfrm>
+        </p:spPr>
+        <p:txBody>
+          <a:bodyPr>
+            <a:normAutofit/>
+          </a:bodyPr>
+          <a:lstStyle/>
+          <a:p>
+            <a:pPr>
+              <a:lnSpc>
+                <a:spcPct val="90000"/>
+              </a:lnSpc>
+            </a:pPr>
+            <a:r>
+              <a:rPr lang="en-GB" sz="2200"/>
+              <a:t>River plume fronts can be studied through statistical modeling and autonomous path planning.</a:t>
+            </a:r>
+          </a:p>
+          <a:p>
+            <a:pPr>
+              <a:lnSpc>
+                <a:spcPct val="90000"/>
+              </a:lnSpc>
+            </a:pPr>
+            <a:r>
+              <a:rPr lang="en-GB" sz="2200"/>
+              <a:t>Adaptive sampling can enhance oceanographic exploration.</a:t>
+            </a:r>
+          </a:p>
+          <a:p>
+            <a:pPr>
+              <a:lnSpc>
+                <a:spcPct val="90000"/>
+              </a:lnSpc>
+            </a:pPr>
+            <a:r>
+              <a:rPr lang="en-GB" sz="2200"/>
+              <a:t>This slide shows an example of ocean fronts.</a:t>
+            </a:r>
+            <a:endParaRPr lang="en-NO" sz="2200"/>
+          </a:p>
+        </p:txBody>
+      </p:sp>
+    </p:spTree>
+    <p:extLst>
+      <p:ext uri="{BB962C8B-B14F-4D97-AF65-F5344CB8AC3E}">
+        <p14:creationId xmlns:p14="http://schemas.microsoft.com/office/powerpoint/2010/main" val="861047374"/>
       </p:ext>
     </p:extLst>
   </p:cSld>

</xml_diff>

<commit_message>
close to finish this page
</commit_message>
<xml_diff>
--- a/presentation/slides/phd.pptx
+++ b/presentation/slides/phd.pptx
@@ -5,15 +5,17 @@
     <p:sldMasterId id="2147483648" r:id="rId1"/>
   </p:sldMasterIdLst>
   <p:notesMasterIdLst>
-    <p:notesMasterId r:id="rId8"/>
+    <p:notesMasterId r:id="rId10"/>
   </p:notesMasterIdLst>
   <p:sldIdLst>
     <p:sldId id="256" r:id="rId2"/>
     <p:sldId id="258" r:id="rId3"/>
     <p:sldId id="259" r:id="rId4"/>
     <p:sldId id="260" r:id="rId5"/>
-    <p:sldId id="257" r:id="rId6"/>
-    <p:sldId id="261" r:id="rId7"/>
+    <p:sldId id="262" r:id="rId6"/>
+    <p:sldId id="263" r:id="rId7"/>
+    <p:sldId id="257" r:id="rId8"/>
+    <p:sldId id="261" r:id="rId9"/>
   </p:sldIdLst>
   <p:sldSz cx="9144000" cy="5143500" type="screen16x9"/>
   <p:notesSz cx="6858000" cy="9144000"/>
@@ -121,6 +123,8 @@
             <p14:sldId id="258"/>
             <p14:sldId id="259"/>
             <p14:sldId id="260"/>
+            <p14:sldId id="262"/>
+            <p14:sldId id="263"/>
             <p14:sldId id="257"/>
             <p14:sldId id="261"/>
           </p14:sldIdLst>
@@ -227,7 +231,7 @@
           <a:p>
             <a:fld id="{E5B84350-0474-7241-AC56-ADCC56DF708A}" type="datetimeFigureOut">
               <a:rPr lang="en-NO" smtClean="0"/>
-              <a:t>26/04/2024</a:t>
+              <a:t>27/04/2024</a:t>
             </a:fld>
             <a:endParaRPr lang="en-NO"/>
           </a:p>
@@ -734,7 +738,7 @@
           <a:p>
             <a:fld id="{E62788E2-7A01-D94F-A69A-99201CD12588}" type="slidenum">
               <a:rPr lang="en-NO" smtClean="0"/>
-              <a:t>6</a:t>
+              <a:t>8</a:t>
             </a:fld>
             <a:endParaRPr lang="en-NO"/>
           </a:p>
@@ -4196,6 +4200,161 @@
           <a:chExt cx="0" cy="0"/>
         </a:xfrm>
       </p:grpSpPr>
+      <p:sp>
+        <p:nvSpPr>
+          <p:cNvPr id="2" name="Content Placeholder 1">
+            <a:extLst>
+              <a:ext uri="{FF2B5EF4-FFF2-40B4-BE49-F238E27FC236}">
+                <a16:creationId xmlns:a16="http://schemas.microsoft.com/office/drawing/2014/main" id="{DE7BBD1B-F3C4-A17E-D38D-D42732F02453}"/>
+              </a:ext>
+            </a:extLst>
+          </p:cNvPr>
+          <p:cNvSpPr>
+            <a:spLocks noGrp="1"/>
+          </p:cNvSpPr>
+          <p:nvPr>
+            <p:ph idx="1"/>
+          </p:nvPr>
+        </p:nvSpPr>
+        <p:spPr/>
+        <p:txBody>
+          <a:bodyPr/>
+          <a:lstStyle/>
+          <a:p>
+            <a:r>
+              <a:rPr lang="en-GB" dirty="0">
+                <a:solidFill>
+                  <a:srgbClr val="000000"/>
+                </a:solidFill>
+                <a:effectLst/>
+                <a:latin typeface="Helvetica Neue" panose="02000503000000020004" pitchFamily="2" charset="0"/>
+              </a:rPr>
+              <a:t>It is a major heat reservoir, influencing weather patterns and moderating temperatures around the world (Rhein et al. 2013).</a:t>
+            </a:r>
+          </a:p>
+          <a:p>
+            <a:endParaRPr lang="en-NO" dirty="0"/>
+          </a:p>
+        </p:txBody>
+      </p:sp>
+      <p:sp>
+        <p:nvSpPr>
+          <p:cNvPr id="3" name="Title 2">
+            <a:extLst>
+              <a:ext uri="{FF2B5EF4-FFF2-40B4-BE49-F238E27FC236}">
+                <a16:creationId xmlns:a16="http://schemas.microsoft.com/office/drawing/2014/main" id="{8E16ABC7-D770-6121-D72A-F9EB682B2075}"/>
+              </a:ext>
+            </a:extLst>
+          </p:cNvPr>
+          <p:cNvSpPr>
+            <a:spLocks noGrp="1"/>
+          </p:cNvSpPr>
+          <p:nvPr>
+            <p:ph type="title"/>
+          </p:nvPr>
+        </p:nvSpPr>
+        <p:spPr/>
+        <p:txBody>
+          <a:bodyPr/>
+          <a:lstStyle/>
+          <a:p>
+            <a:r>
+              <a:rPr lang="en-NO" dirty="0"/>
+              <a:t>Ocean as a heat reservoir</a:t>
+            </a:r>
+          </a:p>
+        </p:txBody>
+      </p:sp>
+      <p:pic>
+        <p:nvPicPr>
+          <p:cNvPr id="4" name="Picture 3" descr="Cartoon earth holding a thermometer in a wave&#10;&#10;Description automatically generated">
+            <a:extLst>
+              <a:ext uri="{FF2B5EF4-FFF2-40B4-BE49-F238E27FC236}">
+                <a16:creationId xmlns:a16="http://schemas.microsoft.com/office/drawing/2014/main" id="{C00B471C-BBE4-7658-C5FE-451533D5E910}"/>
+              </a:ext>
+            </a:extLst>
+          </p:cNvPr>
+          <p:cNvPicPr>
+            <a:picLocks noChangeAspect="1"/>
+          </p:cNvPicPr>
+          <p:nvPr/>
+        </p:nvPicPr>
+        <p:blipFill>
+          <a:blip r:embed="rId2"/>
+          <a:stretch>
+            <a:fillRect/>
+          </a:stretch>
+        </p:blipFill>
+        <p:spPr>
+          <a:xfrm>
+            <a:off x="523572" y="951190"/>
+            <a:ext cx="3241120" cy="3241120"/>
+          </a:xfrm>
+          <a:prstGeom prst="rect">
+            <a:avLst/>
+          </a:prstGeom>
+        </p:spPr>
+      </p:pic>
+    </p:spTree>
+    <p:extLst>
+      <p:ext uri="{BB962C8B-B14F-4D97-AF65-F5344CB8AC3E}">
+        <p14:creationId xmlns:p14="http://schemas.microsoft.com/office/powerpoint/2010/main" val="3621400343"/>
+      </p:ext>
+    </p:extLst>
+  </p:cSld>
+  <p:clrMapOvr>
+    <a:masterClrMapping/>
+  </p:clrMapOvr>
+</p:sld>
+</file>
+
+<file path=ppt/slides/slide6.xml><?xml version="1.0" encoding="utf-8"?>
+<p:sld xmlns:a="http://schemas.openxmlformats.org/drawingml/2006/main" xmlns:r="http://schemas.openxmlformats.org/officeDocument/2006/relationships" xmlns:p="http://schemas.openxmlformats.org/presentationml/2006/main">
+  <p:cSld>
+    <p:spTree>
+      <p:nvGrpSpPr>
+        <p:cNvPr id="1" name=""/>
+        <p:cNvGrpSpPr/>
+        <p:nvPr/>
+      </p:nvGrpSpPr>
+      <p:grpSpPr>
+        <a:xfrm>
+          <a:off x="0" y="0"/>
+          <a:ext cx="0" cy="0"/>
+          <a:chOff x="0" y="0"/>
+          <a:chExt cx="0" cy="0"/>
+        </a:xfrm>
+      </p:grpSpPr>
+    </p:spTree>
+    <p:extLst>
+      <p:ext uri="{BB962C8B-B14F-4D97-AF65-F5344CB8AC3E}">
+        <p14:creationId xmlns:p14="http://schemas.microsoft.com/office/powerpoint/2010/main" val="3904820106"/>
+      </p:ext>
+    </p:extLst>
+  </p:cSld>
+  <p:clrMapOvr>
+    <a:masterClrMapping/>
+  </p:clrMapOvr>
+</p:sld>
+</file>
+
+<file path=ppt/slides/slide7.xml><?xml version="1.0" encoding="utf-8"?>
+<p:sld xmlns:a="http://schemas.openxmlformats.org/drawingml/2006/main" xmlns:r="http://schemas.openxmlformats.org/officeDocument/2006/relationships" xmlns:p="http://schemas.openxmlformats.org/presentationml/2006/main">
+  <p:cSld>
+    <p:spTree>
+      <p:nvGrpSpPr>
+        <p:cNvPr id="1" name=""/>
+        <p:cNvGrpSpPr/>
+        <p:nvPr/>
+      </p:nvGrpSpPr>
+      <p:grpSpPr>
+        <a:xfrm>
+          <a:off x="0" y="0"/>
+          <a:ext cx="0" cy="0"/>
+          <a:chOff x="0" y="0"/>
+          <a:chExt cx="0" cy="0"/>
+        </a:xfrm>
+      </p:grpSpPr>
     </p:spTree>
     <p:extLst>
       <p:ext uri="{BB962C8B-B14F-4D97-AF65-F5344CB8AC3E}">
@@ -4209,7 +4368,7 @@
 </p:sld>
 </file>
 
-<file path=ppt/slides/slide6.xml><?xml version="1.0" encoding="utf-8"?>
+<file path=ppt/slides/slide8.xml><?xml version="1.0" encoding="utf-8"?>
 <p:sld xmlns:a="http://schemas.openxmlformats.org/drawingml/2006/main" xmlns:r="http://schemas.openxmlformats.org/officeDocument/2006/relationships" xmlns:p="http://schemas.openxmlformats.org/presentationml/2006/main">
   <p:cSld>
     <p:spTree>

</xml_diff>